<commit_message>
added the GitHub Pages link
</commit_message>
<xml_diff>
--- a/guide/2018-Teacher-Training.pptx
+++ b/guide/2018-Teacher-Training.pptx
@@ -209,7 +209,7 @@
           <a:p>
             <a:fld id="{BEC7F16E-4C38-1E41-84AF-AA19D4DCBAA8}" type="datetimeFigureOut">
               <a:rPr lang="en-US" smtClean="0"/>
-              <a:t>10/14/18</a:t>
+              <a:t>10/27/18</a:t>
             </a:fld>
             <a:endParaRPr lang="en-US"/>
           </a:p>
@@ -742,7 +742,7 @@
           <a:p>
             <a:fld id="{3CA7CF7C-1FA5-40F9-B14A-8E1D58938A8E}" type="datetimeFigureOut">
               <a:rPr lang="en-US" smtClean="0"/>
-              <a:t>10/14/18</a:t>
+              <a:t>10/27/18</a:t>
             </a:fld>
             <a:endParaRPr lang="en-US"/>
           </a:p>
@@ -907,7 +907,7 @@
           <a:p>
             <a:fld id="{3CA7CF7C-1FA5-40F9-B14A-8E1D58938A8E}" type="datetimeFigureOut">
               <a:rPr lang="en-US" smtClean="0"/>
-              <a:t>10/14/18</a:t>
+              <a:t>10/27/18</a:t>
             </a:fld>
             <a:endParaRPr lang="en-US"/>
           </a:p>
@@ -1082,7 +1082,7 @@
           <a:p>
             <a:fld id="{3CA7CF7C-1FA5-40F9-B14A-8E1D58938A8E}" type="datetimeFigureOut">
               <a:rPr lang="en-US" smtClean="0"/>
-              <a:t>10/14/18</a:t>
+              <a:t>10/27/18</a:t>
             </a:fld>
             <a:endParaRPr lang="en-US"/>
           </a:p>
@@ -1247,7 +1247,7 @@
           <a:p>
             <a:fld id="{3CA7CF7C-1FA5-40F9-B14A-8E1D58938A8E}" type="datetimeFigureOut">
               <a:rPr lang="en-US" smtClean="0"/>
-              <a:t>10/14/18</a:t>
+              <a:t>10/27/18</a:t>
             </a:fld>
             <a:endParaRPr lang="en-US"/>
           </a:p>
@@ -1488,7 +1488,7 @@
           <a:p>
             <a:fld id="{3CA7CF7C-1FA5-40F9-B14A-8E1D58938A8E}" type="datetimeFigureOut">
               <a:rPr lang="en-US" smtClean="0"/>
-              <a:t>10/14/18</a:t>
+              <a:t>10/27/18</a:t>
             </a:fld>
             <a:endParaRPr lang="en-US"/>
           </a:p>
@@ -1771,7 +1771,7 @@
           <a:p>
             <a:fld id="{3CA7CF7C-1FA5-40F9-B14A-8E1D58938A8E}" type="datetimeFigureOut">
               <a:rPr lang="en-US" smtClean="0"/>
-              <a:t>10/14/18</a:t>
+              <a:t>10/27/18</a:t>
             </a:fld>
             <a:endParaRPr lang="en-US"/>
           </a:p>
@@ -2193,7 +2193,7 @@
           <a:p>
             <a:fld id="{3CA7CF7C-1FA5-40F9-B14A-8E1D58938A8E}" type="datetimeFigureOut">
               <a:rPr lang="en-US" smtClean="0"/>
-              <a:t>10/14/18</a:t>
+              <a:t>10/27/18</a:t>
             </a:fld>
             <a:endParaRPr lang="en-US"/>
           </a:p>
@@ -2306,7 +2306,7 @@
           <a:p>
             <a:fld id="{3CA7CF7C-1FA5-40F9-B14A-8E1D58938A8E}" type="datetimeFigureOut">
               <a:rPr lang="en-US" smtClean="0"/>
-              <a:t>10/14/18</a:t>
+              <a:t>10/27/18</a:t>
             </a:fld>
             <a:endParaRPr lang="en-US"/>
           </a:p>
@@ -2396,7 +2396,7 @@
           <a:p>
             <a:fld id="{3CA7CF7C-1FA5-40F9-B14A-8E1D58938A8E}" type="datetimeFigureOut">
               <a:rPr lang="en-US" smtClean="0"/>
-              <a:t>10/14/18</a:t>
+              <a:t>10/27/18</a:t>
             </a:fld>
             <a:endParaRPr lang="en-US"/>
           </a:p>
@@ -2668,7 +2668,7 @@
           <a:p>
             <a:fld id="{3CA7CF7C-1FA5-40F9-B14A-8E1D58938A8E}" type="datetimeFigureOut">
               <a:rPr lang="en-US" smtClean="0"/>
-              <a:t>10/14/18</a:t>
+              <a:t>10/27/18</a:t>
             </a:fld>
             <a:endParaRPr lang="en-US"/>
           </a:p>
@@ -2916,7 +2916,7 @@
           <a:p>
             <a:fld id="{3CA7CF7C-1FA5-40F9-B14A-8E1D58938A8E}" type="datetimeFigureOut">
               <a:rPr lang="en-US" smtClean="0"/>
-              <a:t>10/14/18</a:t>
+              <a:t>10/27/18</a:t>
             </a:fld>
             <a:endParaRPr lang="en-US"/>
           </a:p>
@@ -3124,7 +3124,7 @@
           <a:p>
             <a:fld id="{3CA7CF7C-1FA5-40F9-B14A-8E1D58938A8E}" type="datetimeFigureOut">
               <a:rPr lang="en-US" smtClean="0"/>
-              <a:t>10/14/18</a:t>
+              <a:t>10/27/18</a:t>
             </a:fld>
             <a:endParaRPr lang="en-US"/>
           </a:p>
@@ -3847,11 +3847,7 @@
               </a:r>
               <a:r>
                 <a:rPr lang="en-US" sz="1200" dirty="0" smtClean="0"/>
-                <a:t>0 </a:t>
-              </a:r>
-              <a:r>
-                <a:rPr lang="en-US" sz="1200" dirty="0" smtClean="0"/>
-                <a:t>pixel NeoPixel strip with GND (black), 5v (red) and data (yellow)</a:t>
+                <a:t>0 pixel NeoPixel strip with GND (black), 5v (red) and data (yellow)</a:t>
               </a:r>
             </a:p>
             <a:p>
@@ -3861,15 +3857,7 @@
               </a:pPr>
               <a:r>
                 <a:rPr lang="en-US" sz="1200" dirty="0" smtClean="0"/>
-                <a:t>2 Momentary </a:t>
-              </a:r>
-              <a:r>
-                <a:rPr lang="en-US" sz="1200" dirty="0" smtClean="0"/>
-                <a:t>push buttons and </a:t>
-              </a:r>
-              <a:r>
-                <a:rPr lang="en-US" sz="1200" dirty="0" smtClean="0"/>
-                <a:t>hookup wire</a:t>
+                <a:t>2 Momentary push buttons and hookup wire</a:t>
               </a:r>
             </a:p>
             <a:p>
@@ -3889,7 +3877,11 @@
               </a:pPr>
               <a:r>
                 <a:rPr lang="en-US" sz="1200" dirty="0" smtClean="0"/>
-                <a:t>4 AA Battery pack</a:t>
+                <a:t>Battery pack </a:t>
+              </a:r>
+              <a:r>
+                <a:rPr lang="en-US" sz="1200" smtClean="0"/>
+                <a:t>with switch</a:t>
               </a:r>
               <a:endParaRPr lang="en-US" sz="1200" dirty="0" smtClean="0"/>
             </a:p>
@@ -4929,11 +4921,7 @@
             </a:r>
             <a:r>
               <a:rPr lang="en-US" sz="1000" smtClean="0"/>
-              <a:t>to </a:t>
-            </a:r>
-            <a:r>
-              <a:rPr lang="en-US" sz="1000" smtClean="0"/>
-              <a:t>COM or /dev/cu.wchusbserial1420</a:t>
+              <a:t>to COM or /dev/cu.wchusbserial1420</a:t>
             </a:r>
             <a:endParaRPr lang="en-US" sz="1000" dirty="0"/>
           </a:p>
@@ -5076,11 +5064,7 @@
             </a:r>
             <a:r>
               <a:rPr lang="en-US" sz="1050" dirty="0" smtClean="0"/>
-              <a:t>r “COM4</a:t>
-            </a:r>
-            <a:r>
-              <a:rPr lang="en-US" sz="1050" dirty="0" smtClean="0"/>
-              <a:t>”.  On a Mac the</a:t>
+              <a:t>r “COM4”.  On a Mac the</a:t>
             </a:r>
           </a:p>
           <a:p>
@@ -5775,19 +5759,7 @@
                 <a:rPr lang="en-US" sz="1200" dirty="0" smtClean="0">
                   <a:latin typeface="Arial Narrow" pitchFamily="34" charset="0"/>
                 </a:rPr>
-                <a:t>#define NUMBER_PIXELS </a:t>
-              </a:r>
-              <a:r>
-                <a:rPr lang="en-US" sz="1200" dirty="0" smtClean="0">
-                  <a:latin typeface="Arial Narrow" pitchFamily="34" charset="0"/>
-                </a:rPr>
-                <a:t>60 </a:t>
-              </a:r>
-              <a:r>
-                <a:rPr lang="en-US" sz="1200" dirty="0" smtClean="0">
-                  <a:latin typeface="Arial Narrow" pitchFamily="34" charset="0"/>
-                </a:rPr>
-                <a:t>/</a:t>
+                <a:t>#define NUMBER_PIXELS 60 /</a:t>
               </a:r>
               <a:r>
                 <a:rPr lang="en-US" sz="1200" dirty="0">
@@ -6928,11 +6900,7 @@
               </a:pPr>
               <a:r>
                 <a:rPr lang="en-US" sz="1200" dirty="0" smtClean="0"/>
-                <a:t>Change the speed of flashing to be </a:t>
-              </a:r>
-              <a:r>
-                <a:rPr lang="en-US" sz="1200" dirty="0" smtClean="0"/>
-                <a:t>1/50</a:t>
+                <a:t>Change the speed of flashing to be 1/50</a:t>
               </a:r>
               <a:r>
                 <a:rPr lang="en-US" sz="1200" baseline="30000" dirty="0" smtClean="0"/>
@@ -6940,15 +6908,7 @@
               </a:r>
               <a:r>
                 <a:rPr lang="en-US" sz="1200" dirty="0" smtClean="0"/>
-                <a:t> </a:t>
-              </a:r>
-              <a:r>
-                <a:rPr lang="en-US" sz="1200" dirty="0" smtClean="0"/>
-                <a:t>of a second on and </a:t>
-              </a:r>
-              <a:r>
-                <a:rPr lang="en-US" sz="1200" dirty="0" smtClean="0"/>
-                <a:t>1/50</a:t>
+                <a:t> of a second on and 1/50</a:t>
               </a:r>
               <a:r>
                 <a:rPr lang="en-US" sz="1200" baseline="30000" dirty="0" smtClean="0"/>
@@ -6956,11 +6916,7 @@
               </a:r>
               <a:r>
                 <a:rPr lang="en-US" sz="1200" dirty="0" smtClean="0"/>
-                <a:t> of </a:t>
-              </a:r>
-              <a:r>
-                <a:rPr lang="en-US" sz="1200" dirty="0" smtClean="0"/>
-                <a:t>a second off</a:t>
+                <a:t> of a second off</a:t>
               </a:r>
             </a:p>
             <a:p>
@@ -6990,19 +6946,7 @@
               </a:pPr>
               <a:r>
                 <a:rPr lang="en-US" sz="1200" dirty="0" smtClean="0"/>
-                <a:t>Run </a:t>
-              </a:r>
-              <a:r>
-                <a:rPr lang="en-US" sz="1200" dirty="0" smtClean="0"/>
-                <a:t>the other NeoPixel </a:t>
-              </a:r>
-              <a:r>
-                <a:rPr lang="en-US" sz="1200" dirty="0" smtClean="0"/>
-                <a:t>example programs </a:t>
-              </a:r>
-              <a:r>
-                <a:rPr lang="en-US" sz="1200" dirty="0" smtClean="0"/>
-                <a:t>(like </a:t>
+                <a:t>Run the other NeoPixel example programs (like </a:t>
               </a:r>
               <a:r>
                 <a:rPr lang="en-US" sz="1200" dirty="0" err="1" smtClean="0"/>
@@ -7020,13 +6964,8 @@
               </a:pPr>
               <a:r>
                 <a:rPr lang="en-US" sz="1200" dirty="0" smtClean="0"/>
-                <a:t>Find Moving Rainbow </a:t>
-              </a:r>
-              <a:r>
-                <a:rPr lang="en-US" sz="1200" dirty="0" smtClean="0"/>
-                <a:t>examples </a:t>
-              </a:r>
-              <a:endParaRPr lang="en-US" sz="1200" dirty="0" smtClean="0"/>
+                <a:t>Find Moving Rainbow examples </a:t>
+              </a:r>
             </a:p>
             <a:p>
               <a:pPr marL="342900" indent="-342900">
@@ -7053,15 +6992,7 @@
               </a:r>
               <a:r>
                 <a:rPr lang="en-US" sz="1200" dirty="0" smtClean="0"/>
-                <a:t> find </a:t>
-              </a:r>
-              <a:r>
-                <a:rPr lang="en-US" sz="1200" dirty="0" smtClean="0"/>
-                <a:t>hackday-2018 </a:t>
-              </a:r>
-              <a:r>
-                <a:rPr lang="en-US" sz="1200" dirty="0" smtClean="0"/>
-                <a:t>LED strip two buttons program</a:t>
+                <a:t> find hackday-2018 LED strip two buttons program</a:t>
               </a:r>
             </a:p>
             <a:p>
@@ -7101,11 +7032,7 @@
               </a:pPr>
               <a:r>
                 <a:rPr lang="en-US" sz="1200" dirty="0" smtClean="0"/>
-                <a:t>Can you create a game?  Can you trap a moving pixel in a “jail” to get a point</a:t>
-              </a:r>
-              <a:r>
-                <a:rPr lang="en-US" sz="1200" dirty="0" smtClean="0"/>
-                <a:t>?</a:t>
+                <a:t>Can you create a game?  Can you trap a moving pixel in a “jail” to get a point?</a:t>
               </a:r>
             </a:p>
             <a:p>
@@ -7140,11 +7067,7 @@
               </a:pPr>
               <a:r>
                 <a:rPr lang="en-US" sz="1200" dirty="0" smtClean="0"/>
-                <a:t>Look up</a:t>
-              </a:r>
-              <a:r>
-                <a:rPr lang="en-US" sz="1200" dirty="0" smtClean="0"/>
-                <a:t> Arduino Interrupt </a:t>
+                <a:t>Look up Arduino Interrupt </a:t>
               </a:r>
               <a:r>
                 <a:rPr lang="en-US" sz="1200" dirty="0"/>

</xml_diff>